<commit_message>
Syncing with the GitHub repository (42d1b806a74dcdc7b78c3eae2239b1b099a060d4).
</commit_message>
<xml_diff>
--- a/Sources/Accord.Docs/Accord.Documentation/Resources/Accord.NET.pptx
+++ b/Sources/Accord.Docs/Accord.Documentation/Resources/Accord.NET.pptx
@@ -10,6 +10,7 @@
     <p:sldId id="258" r:id="rId4"/>
     <p:sldId id="259" r:id="rId5"/>
     <p:sldId id="260" r:id="rId6"/>
+    <p:sldId id="261" r:id="rId7"/>
   </p:sldIdLst>
   <p:sldSz cx="9144000" cy="6858000" type="screen4x3"/>
   <p:notesSz cx="6858000" cy="9144000"/>
@@ -292,7 +293,7 @@
           <a:p>
             <a:fld id="{8F8B13FF-CD9B-489D-BECD-99196539CA05}" type="datetimeFigureOut">
               <a:rPr lang="pt-BR" smtClean="0"/>
-              <a:t>29/10/2010</a:t>
+              <a:t>07/09/2013</a:t>
             </a:fld>
             <a:endParaRPr lang="pt-BR"/>
           </a:p>
@@ -462,7 +463,7 @@
           <a:p>
             <a:fld id="{8F8B13FF-CD9B-489D-BECD-99196539CA05}" type="datetimeFigureOut">
               <a:rPr lang="pt-BR" smtClean="0"/>
-              <a:t>29/10/2010</a:t>
+              <a:t>07/09/2013</a:t>
             </a:fld>
             <a:endParaRPr lang="pt-BR"/>
           </a:p>
@@ -642,7 +643,7 @@
           <a:p>
             <a:fld id="{8F8B13FF-CD9B-489D-BECD-99196539CA05}" type="datetimeFigureOut">
               <a:rPr lang="pt-BR" smtClean="0"/>
-              <a:t>29/10/2010</a:t>
+              <a:t>07/09/2013</a:t>
             </a:fld>
             <a:endParaRPr lang="pt-BR"/>
           </a:p>
@@ -812,7 +813,7 @@
           <a:p>
             <a:fld id="{8F8B13FF-CD9B-489D-BECD-99196539CA05}" type="datetimeFigureOut">
               <a:rPr lang="pt-BR" smtClean="0"/>
-              <a:t>29/10/2010</a:t>
+              <a:t>07/09/2013</a:t>
             </a:fld>
             <a:endParaRPr lang="pt-BR"/>
           </a:p>
@@ -1058,7 +1059,7 @@
           <a:p>
             <a:fld id="{8F8B13FF-CD9B-489D-BECD-99196539CA05}" type="datetimeFigureOut">
               <a:rPr lang="pt-BR" smtClean="0"/>
-              <a:t>29/10/2010</a:t>
+              <a:t>07/09/2013</a:t>
             </a:fld>
             <a:endParaRPr lang="pt-BR"/>
           </a:p>
@@ -1346,7 +1347,7 @@
           <a:p>
             <a:fld id="{8F8B13FF-CD9B-489D-BECD-99196539CA05}" type="datetimeFigureOut">
               <a:rPr lang="pt-BR" smtClean="0"/>
-              <a:t>29/10/2010</a:t>
+              <a:t>07/09/2013</a:t>
             </a:fld>
             <a:endParaRPr lang="pt-BR"/>
           </a:p>
@@ -1768,7 +1769,7 @@
           <a:p>
             <a:fld id="{8F8B13FF-CD9B-489D-BECD-99196539CA05}" type="datetimeFigureOut">
               <a:rPr lang="pt-BR" smtClean="0"/>
-              <a:t>29/10/2010</a:t>
+              <a:t>07/09/2013</a:t>
             </a:fld>
             <a:endParaRPr lang="pt-BR"/>
           </a:p>
@@ -1886,7 +1887,7 @@
           <a:p>
             <a:fld id="{8F8B13FF-CD9B-489D-BECD-99196539CA05}" type="datetimeFigureOut">
               <a:rPr lang="pt-BR" smtClean="0"/>
-              <a:t>29/10/2010</a:t>
+              <a:t>07/09/2013</a:t>
             </a:fld>
             <a:endParaRPr lang="pt-BR"/>
           </a:p>
@@ -1981,7 +1982,7 @@
           <a:p>
             <a:fld id="{8F8B13FF-CD9B-489D-BECD-99196539CA05}" type="datetimeFigureOut">
               <a:rPr lang="pt-BR" smtClean="0"/>
-              <a:t>29/10/2010</a:t>
+              <a:t>07/09/2013</a:t>
             </a:fld>
             <a:endParaRPr lang="pt-BR"/>
           </a:p>
@@ -2258,7 +2259,7 @@
           <a:p>
             <a:fld id="{8F8B13FF-CD9B-489D-BECD-99196539CA05}" type="datetimeFigureOut">
               <a:rPr lang="pt-BR" smtClean="0"/>
-              <a:t>29/10/2010</a:t>
+              <a:t>07/09/2013</a:t>
             </a:fld>
             <a:endParaRPr lang="pt-BR"/>
           </a:p>
@@ -2511,7 +2512,7 @@
           <a:p>
             <a:fld id="{8F8B13FF-CD9B-489D-BECD-99196539CA05}" type="datetimeFigureOut">
               <a:rPr lang="pt-BR" smtClean="0"/>
-              <a:t>29/10/2010</a:t>
+              <a:t>07/09/2013</a:t>
             </a:fld>
             <a:endParaRPr lang="pt-BR"/>
           </a:p>
@@ -2724,7 +2725,7 @@
           <a:p>
             <a:fld id="{8F8B13FF-CD9B-489D-BECD-99196539CA05}" type="datetimeFigureOut">
               <a:rPr lang="pt-BR" smtClean="0"/>
-              <a:t>29/10/2010</a:t>
+              <a:t>07/09/2013</a:t>
             </a:fld>
             <a:endParaRPr lang="pt-BR"/>
           </a:p>
@@ -3140,7 +3141,7 @@
             <a:ext uri="{909E8E84-426E-40DD-AFC4-6F175D3DCCD1}">
               <a14:hiddenFill xmlns:a14="http://schemas.microsoft.com/office/drawing/2010/main">
                 <a:solidFill>
-                  <a:srgbClr xmlns:mc="http://schemas.openxmlformats.org/markup-compatibility/2006" val="FFFFFF" mc:Ignorable=""/>
+                  <a:srgbClr val="FFFFFF"/>
                 </a:solidFill>
               </a14:hiddenFill>
             </a:ext>
@@ -3417,7 +3418,7 @@
             <a:ext uri="{909E8E84-426E-40DD-AFC4-6F175D3DCCD1}">
               <a14:hiddenFill xmlns:a14="http://schemas.microsoft.com/office/drawing/2010/main">
                 <a:solidFill>
-                  <a:srgbClr xmlns:mc="http://schemas.openxmlformats.org/markup-compatibility/2006" val="FFFFFF" mc:Ignorable=""/>
+                  <a:srgbClr val="FFFFFF"/>
                 </a:solidFill>
               </a14:hiddenFill>
             </a:ext>
@@ -3560,7 +3561,7 @@
           </a:ln>
           <a:effectLst>
             <a:outerShdw blurRad="292100" dist="139700" dir="2700000" algn="tl" rotWithShape="0">
-              <a:srgbClr xmlns:mc="http://schemas.openxmlformats.org/markup-compatibility/2006" xmlns:a14="http://schemas.microsoft.com/office/drawing/2010/main" val="333333" mc:Ignorable="">
+              <a:srgbClr val="333333">
                 <a:alpha val="30000"/>
               </a:srgbClr>
             </a:outerShdw>
@@ -3569,7 +3570,7 @@
             <a:ext uri="{909E8E84-426E-40DD-AFC4-6F175D3DCCD1}">
               <a14:hiddenFill xmlns:a14="http://schemas.microsoft.com/office/drawing/2010/main">
                 <a:solidFill>
-                  <a:srgbClr xmlns:mc="http://schemas.openxmlformats.org/markup-compatibility/2006" val="FFFFFF" mc:Ignorable=""/>
+                  <a:srgbClr val="FFFFFF"/>
                 </a:solidFill>
               </a14:hiddenFill>
             </a:ext>
@@ -3800,7 +3801,7 @@
           </a:ln>
           <a:effectLst>
             <a:outerShdw blurRad="292100" dist="139700" dir="2700000" algn="tl" rotWithShape="0">
-              <a:srgbClr xmlns:mc="http://schemas.openxmlformats.org/markup-compatibility/2006" xmlns:a14="http://schemas.microsoft.com/office/drawing/2010/main" val="333333" mc:Ignorable="">
+              <a:srgbClr val="333333">
                 <a:alpha val="91000"/>
               </a:srgbClr>
             </a:outerShdw>
@@ -3809,7 +3810,7 @@
             <a:ext uri="{909E8E84-426E-40DD-AFC4-6F175D3DCCD1}">
               <a14:hiddenFill xmlns:a14="http://schemas.microsoft.com/office/drawing/2010/main">
                 <a:solidFill>
-                  <a:srgbClr xmlns:mc="http://schemas.openxmlformats.org/markup-compatibility/2006" val="FFFFFF" mc:Ignorable=""/>
+                  <a:srgbClr val="FFFFFF"/>
                 </a:solidFill>
               </a14:hiddenFill>
             </a:ext>
@@ -3880,7 +3881,7 @@
           </a:ln>
           <a:effectLst>
             <a:outerShdw blurRad="190500" algn="tl" rotWithShape="0">
-              <a:srgbClr xmlns:mc="http://schemas.openxmlformats.org/markup-compatibility/2006" xmlns:a14="http://schemas.microsoft.com/office/drawing/2010/main" val="000000" mc:Ignorable="">
+              <a:srgbClr val="000000">
                 <a:alpha val="70000"/>
               </a:srgbClr>
             </a:outerShdw>
@@ -3889,7 +3890,7 @@
             <a:ext uri="{909E8E84-426E-40DD-AFC4-6F175D3DCCD1}">
               <a14:hiddenFill xmlns:a14="http://schemas.microsoft.com/office/drawing/2010/main">
                 <a:solidFill>
-                  <a:srgbClr xmlns:mc="http://schemas.openxmlformats.org/markup-compatibility/2006" val="FFFFFF" mc:Ignorable=""/>
+                  <a:srgbClr val="FFFFFF"/>
                 </a:solidFill>
               </a14:hiddenFill>
             </a:ext>
@@ -3960,7 +3961,7 @@
           </a:ln>
           <a:effectLst>
             <a:outerShdw blurRad="190500" algn="tl" rotWithShape="0">
-              <a:srgbClr xmlns:mc="http://schemas.openxmlformats.org/markup-compatibility/2006" xmlns:a14="http://schemas.microsoft.com/office/drawing/2010/main" val="000000" mc:Ignorable="">
+              <a:srgbClr val="000000">
                 <a:alpha val="70000"/>
               </a:srgbClr>
             </a:outerShdw>
@@ -3969,7 +3970,7 @@
             <a:ext uri="{909E8E84-426E-40DD-AFC4-6F175D3DCCD1}">
               <a14:hiddenFill xmlns:a14="http://schemas.microsoft.com/office/drawing/2010/main">
                 <a:solidFill>
-                  <a:srgbClr xmlns:mc="http://schemas.openxmlformats.org/markup-compatibility/2006" val="FFFFFF" mc:Ignorable=""/>
+                  <a:srgbClr val="FFFFFF"/>
                 </a:solidFill>
               </a14:hiddenFill>
             </a:ext>
@@ -4001,7 +4002,7 @@
               <a:rPr lang="pt-BR" sz="6600" b="1" dirty="0" smtClean="0">
                 <a:ln w="17780" cmpd="sng">
                   <a:solidFill>
-                    <a:srgbClr xmlns:mc="http://schemas.openxmlformats.org/markup-compatibility/2006" xmlns:a14="http://schemas.microsoft.com/office/drawing/2010/main" val="FFFFFF" mc:Ignorable=""/>
+                    <a:srgbClr val="FFFFFF"/>
                   </a:solidFill>
                   <a:prstDash val="solid"/>
                   <a:miter lim="800000"/>
@@ -4009,34 +4010,34 @@
                 <a:gradFill rotWithShape="1">
                   <a:gsLst>
                     <a:gs pos="0">
-                      <a:srgbClr xmlns:mc="http://schemas.openxmlformats.org/markup-compatibility/2006" xmlns:a14="http://schemas.microsoft.com/office/drawing/2010/main" val="000000" mc:Ignorable="">
+                      <a:srgbClr val="000000">
                         <a:tint val="92000"/>
                         <a:shade val="100000"/>
                         <a:satMod val="150000"/>
                       </a:srgbClr>
                     </a:gs>
                     <a:gs pos="49000">
-                      <a:srgbClr xmlns:mc="http://schemas.openxmlformats.org/markup-compatibility/2006" xmlns:a14="http://schemas.microsoft.com/office/drawing/2010/main" val="000000" mc:Ignorable="">
+                      <a:srgbClr val="000000">
                         <a:tint val="89000"/>
                         <a:shade val="90000"/>
                         <a:satMod val="150000"/>
                       </a:srgbClr>
                     </a:gs>
                     <a:gs pos="50000">
-                      <a:srgbClr xmlns:mc="http://schemas.openxmlformats.org/markup-compatibility/2006" xmlns:a14="http://schemas.microsoft.com/office/drawing/2010/main" val="000000" mc:Ignorable="">
+                      <a:srgbClr val="000000">
                         <a:tint val="100000"/>
                         <a:shade val="75000"/>
                         <a:satMod val="150000"/>
                       </a:srgbClr>
                     </a:gs>
                     <a:gs pos="95000">
-                      <a:srgbClr xmlns:mc="http://schemas.openxmlformats.org/markup-compatibility/2006" xmlns:a14="http://schemas.microsoft.com/office/drawing/2010/main" val="000000" mc:Ignorable="">
+                      <a:srgbClr val="000000">
                         <a:shade val="47000"/>
                         <a:satMod val="150000"/>
                       </a:srgbClr>
                     </a:gs>
                     <a:gs pos="100000">
-                      <a:srgbClr xmlns:mc="http://schemas.openxmlformats.org/markup-compatibility/2006" xmlns:a14="http://schemas.microsoft.com/office/drawing/2010/main" val="000000" mc:Ignorable="">
+                      <a:srgbClr val="000000">
                         <a:shade val="39000"/>
                         <a:satMod val="150000"/>
                       </a:srgbClr>
@@ -4046,7 +4047,7 @@
                 </a:gradFill>
                 <a:effectLst>
                   <a:outerShdw blurRad="50800" algn="tl" rotWithShape="0">
-                    <a:srgbClr xmlns:mc="http://schemas.openxmlformats.org/markup-compatibility/2006" xmlns:a14="http://schemas.microsoft.com/office/drawing/2010/main" val="000000" mc:Ignorable=""/>
+                    <a:srgbClr val="000000"/>
                   </a:outerShdw>
                 </a:effectLst>
                 <a:latin typeface="Aharoni" pitchFamily="2" charset="-79"/>
@@ -4057,7 +4058,7 @@
             <a:endParaRPr lang="pt-BR" sz="6600" b="1" dirty="0">
               <a:ln w="17780" cmpd="sng">
                 <a:solidFill>
-                  <a:srgbClr xmlns:mc="http://schemas.openxmlformats.org/markup-compatibility/2006" xmlns:a14="http://schemas.microsoft.com/office/drawing/2010/main" val="FFFFFF" mc:Ignorable=""/>
+                  <a:srgbClr val="FFFFFF"/>
                 </a:solidFill>
                 <a:prstDash val="solid"/>
                 <a:miter lim="800000"/>
@@ -4065,34 +4066,34 @@
               <a:gradFill rotWithShape="1">
                 <a:gsLst>
                   <a:gs pos="0">
-                    <a:srgbClr xmlns:mc="http://schemas.openxmlformats.org/markup-compatibility/2006" xmlns:a14="http://schemas.microsoft.com/office/drawing/2010/main" val="000000" mc:Ignorable="">
+                    <a:srgbClr val="000000">
                       <a:tint val="92000"/>
                       <a:shade val="100000"/>
                       <a:satMod val="150000"/>
                     </a:srgbClr>
                   </a:gs>
                   <a:gs pos="49000">
-                    <a:srgbClr xmlns:mc="http://schemas.openxmlformats.org/markup-compatibility/2006" xmlns:a14="http://schemas.microsoft.com/office/drawing/2010/main" val="000000" mc:Ignorable="">
+                    <a:srgbClr val="000000">
                       <a:tint val="89000"/>
                       <a:shade val="90000"/>
                       <a:satMod val="150000"/>
                     </a:srgbClr>
                   </a:gs>
                   <a:gs pos="50000">
-                    <a:srgbClr xmlns:mc="http://schemas.openxmlformats.org/markup-compatibility/2006" xmlns:a14="http://schemas.microsoft.com/office/drawing/2010/main" val="000000" mc:Ignorable="">
+                    <a:srgbClr val="000000">
                       <a:tint val="100000"/>
                       <a:shade val="75000"/>
                       <a:satMod val="150000"/>
                     </a:srgbClr>
                   </a:gs>
                   <a:gs pos="95000">
-                    <a:srgbClr xmlns:mc="http://schemas.openxmlformats.org/markup-compatibility/2006" xmlns:a14="http://schemas.microsoft.com/office/drawing/2010/main" val="000000" mc:Ignorable="">
+                    <a:srgbClr val="000000">
                       <a:shade val="47000"/>
                       <a:satMod val="150000"/>
                     </a:srgbClr>
                   </a:gs>
                   <a:gs pos="100000">
-                    <a:srgbClr xmlns:mc="http://schemas.openxmlformats.org/markup-compatibility/2006" xmlns:a14="http://schemas.microsoft.com/office/drawing/2010/main" val="000000" mc:Ignorable="">
+                    <a:srgbClr val="000000">
                       <a:shade val="39000"/>
                       <a:satMod val="150000"/>
                     </a:srgbClr>
@@ -4102,7 +4103,7 @@
               </a:gradFill>
               <a:effectLst>
                 <a:outerShdw blurRad="50800" algn="tl" rotWithShape="0">
-                  <a:srgbClr xmlns:mc="http://schemas.openxmlformats.org/markup-compatibility/2006" xmlns:a14="http://schemas.microsoft.com/office/drawing/2010/main" val="000000" mc:Ignorable=""/>
+                  <a:srgbClr val="000000"/>
                 </a:outerShdw>
               </a:effectLst>
             </a:endParaRPr>
@@ -4134,7 +4135,7 @@
               <a:rPr lang="pt-BR" b="1" dirty="0" smtClean="0">
                 <a:ln w="17780" cmpd="sng">
                   <a:solidFill>
-                    <a:srgbClr xmlns:mc="http://schemas.openxmlformats.org/markup-compatibility/2006" xmlns:a14="http://schemas.microsoft.com/office/drawing/2010/main" val="FFFFFF" mc:Ignorable=""/>
+                    <a:srgbClr val="FFFFFF"/>
                   </a:solidFill>
                   <a:prstDash val="solid"/>
                   <a:miter lim="800000"/>
@@ -4142,34 +4143,34 @@
                 <a:gradFill rotWithShape="1">
                   <a:gsLst>
                     <a:gs pos="0">
-                      <a:srgbClr xmlns:mc="http://schemas.openxmlformats.org/markup-compatibility/2006" xmlns:a14="http://schemas.microsoft.com/office/drawing/2010/main" val="000000" mc:Ignorable="">
+                      <a:srgbClr val="000000">
                         <a:tint val="92000"/>
                         <a:shade val="100000"/>
                         <a:satMod val="150000"/>
                       </a:srgbClr>
                     </a:gs>
                     <a:gs pos="49000">
-                      <a:srgbClr xmlns:mc="http://schemas.openxmlformats.org/markup-compatibility/2006" xmlns:a14="http://schemas.microsoft.com/office/drawing/2010/main" val="000000" mc:Ignorable="">
+                      <a:srgbClr val="000000">
                         <a:tint val="89000"/>
                         <a:shade val="90000"/>
                         <a:satMod val="150000"/>
                       </a:srgbClr>
                     </a:gs>
                     <a:gs pos="50000">
-                      <a:srgbClr xmlns:mc="http://schemas.openxmlformats.org/markup-compatibility/2006" xmlns:a14="http://schemas.microsoft.com/office/drawing/2010/main" val="000000" mc:Ignorable="">
+                      <a:srgbClr val="000000">
                         <a:tint val="100000"/>
                         <a:shade val="75000"/>
                         <a:satMod val="150000"/>
                       </a:srgbClr>
                     </a:gs>
                     <a:gs pos="95000">
-                      <a:srgbClr xmlns:mc="http://schemas.openxmlformats.org/markup-compatibility/2006" xmlns:a14="http://schemas.microsoft.com/office/drawing/2010/main" val="000000" mc:Ignorable="">
+                      <a:srgbClr val="000000">
                         <a:shade val="47000"/>
                         <a:satMod val="150000"/>
                       </a:srgbClr>
                     </a:gs>
                     <a:gs pos="100000">
-                      <a:srgbClr xmlns:mc="http://schemas.openxmlformats.org/markup-compatibility/2006" xmlns:a14="http://schemas.microsoft.com/office/drawing/2010/main" val="000000" mc:Ignorable="">
+                      <a:srgbClr val="000000">
                         <a:shade val="39000"/>
                         <a:satMod val="150000"/>
                       </a:srgbClr>
@@ -4179,7 +4180,7 @@
                 </a:gradFill>
                 <a:effectLst>
                   <a:outerShdw blurRad="50800" algn="tl" rotWithShape="0">
-                    <a:srgbClr xmlns:mc="http://schemas.openxmlformats.org/markup-compatibility/2006" xmlns:a14="http://schemas.microsoft.com/office/drawing/2010/main" val="000000" mc:Ignorable=""/>
+                    <a:srgbClr val="000000"/>
                   </a:outerShdw>
                 </a:effectLst>
                 <a:latin typeface="Aharoni" pitchFamily="2" charset="-79"/>
@@ -4190,7 +4191,7 @@
             <a:endParaRPr lang="pt-BR" b="1" dirty="0">
               <a:ln w="17780" cmpd="sng">
                 <a:solidFill>
-                  <a:srgbClr xmlns:mc="http://schemas.openxmlformats.org/markup-compatibility/2006" xmlns:a14="http://schemas.microsoft.com/office/drawing/2010/main" val="FFFFFF" mc:Ignorable=""/>
+                  <a:srgbClr val="FFFFFF"/>
                 </a:solidFill>
                 <a:prstDash val="solid"/>
                 <a:miter lim="800000"/>
@@ -4198,34 +4199,34 @@
               <a:gradFill rotWithShape="1">
                 <a:gsLst>
                   <a:gs pos="0">
-                    <a:srgbClr xmlns:mc="http://schemas.openxmlformats.org/markup-compatibility/2006" xmlns:a14="http://schemas.microsoft.com/office/drawing/2010/main" val="000000" mc:Ignorable="">
+                    <a:srgbClr val="000000">
                       <a:tint val="92000"/>
                       <a:shade val="100000"/>
                       <a:satMod val="150000"/>
                     </a:srgbClr>
                   </a:gs>
                   <a:gs pos="49000">
-                    <a:srgbClr xmlns:mc="http://schemas.openxmlformats.org/markup-compatibility/2006" xmlns:a14="http://schemas.microsoft.com/office/drawing/2010/main" val="000000" mc:Ignorable="">
+                    <a:srgbClr val="000000">
                       <a:tint val="89000"/>
                       <a:shade val="90000"/>
                       <a:satMod val="150000"/>
                     </a:srgbClr>
                   </a:gs>
                   <a:gs pos="50000">
-                    <a:srgbClr xmlns:mc="http://schemas.openxmlformats.org/markup-compatibility/2006" xmlns:a14="http://schemas.microsoft.com/office/drawing/2010/main" val="000000" mc:Ignorable="">
+                    <a:srgbClr val="000000">
                       <a:tint val="100000"/>
                       <a:shade val="75000"/>
                       <a:satMod val="150000"/>
                     </a:srgbClr>
                   </a:gs>
                   <a:gs pos="95000">
-                    <a:srgbClr xmlns:mc="http://schemas.openxmlformats.org/markup-compatibility/2006" xmlns:a14="http://schemas.microsoft.com/office/drawing/2010/main" val="000000" mc:Ignorable="">
+                    <a:srgbClr val="000000">
                       <a:shade val="47000"/>
                       <a:satMod val="150000"/>
                     </a:srgbClr>
                   </a:gs>
                   <a:gs pos="100000">
-                    <a:srgbClr xmlns:mc="http://schemas.openxmlformats.org/markup-compatibility/2006" xmlns:a14="http://schemas.microsoft.com/office/drawing/2010/main" val="000000" mc:Ignorable="">
+                    <a:srgbClr val="000000">
                       <a:shade val="39000"/>
                       <a:satMod val="150000"/>
                     </a:srgbClr>
@@ -4235,7 +4236,7 @@
               </a:gradFill>
               <a:effectLst>
                 <a:outerShdw blurRad="50800" algn="tl" rotWithShape="0">
-                  <a:srgbClr xmlns:mc="http://schemas.openxmlformats.org/markup-compatibility/2006" xmlns:a14="http://schemas.microsoft.com/office/drawing/2010/main" val="000000" mc:Ignorable=""/>
+                  <a:srgbClr val="000000"/>
                 </a:outerShdw>
               </a:effectLst>
             </a:endParaRPr>
@@ -4267,7 +4268,7 @@
               <a:rPr lang="pt-BR" b="1" dirty="0">
                 <a:ln w="17780" cmpd="sng">
                   <a:solidFill>
-                    <a:srgbClr xmlns:mc="http://schemas.openxmlformats.org/markup-compatibility/2006" xmlns:a14="http://schemas.microsoft.com/office/drawing/2010/main" val="FFFFFF" mc:Ignorable=""/>
+                    <a:srgbClr val="FFFFFF"/>
                   </a:solidFill>
                   <a:prstDash val="solid"/>
                   <a:miter lim="800000"/>
@@ -4275,34 +4276,34 @@
                 <a:gradFill rotWithShape="1">
                   <a:gsLst>
                     <a:gs pos="0">
-                      <a:srgbClr xmlns:mc="http://schemas.openxmlformats.org/markup-compatibility/2006" xmlns:a14="http://schemas.microsoft.com/office/drawing/2010/main" val="000000" mc:Ignorable="">
+                      <a:srgbClr val="000000">
                         <a:tint val="92000"/>
                         <a:shade val="100000"/>
                         <a:satMod val="150000"/>
                       </a:srgbClr>
                     </a:gs>
                     <a:gs pos="49000">
-                      <a:srgbClr xmlns:mc="http://schemas.openxmlformats.org/markup-compatibility/2006" xmlns:a14="http://schemas.microsoft.com/office/drawing/2010/main" val="000000" mc:Ignorable="">
+                      <a:srgbClr val="000000">
                         <a:tint val="89000"/>
                         <a:shade val="90000"/>
                         <a:satMod val="150000"/>
                       </a:srgbClr>
                     </a:gs>
                     <a:gs pos="50000">
-                      <a:srgbClr xmlns:mc="http://schemas.openxmlformats.org/markup-compatibility/2006" xmlns:a14="http://schemas.microsoft.com/office/drawing/2010/main" val="000000" mc:Ignorable="">
+                      <a:srgbClr val="000000">
                         <a:tint val="100000"/>
                         <a:shade val="75000"/>
                         <a:satMod val="150000"/>
                       </a:srgbClr>
                     </a:gs>
                     <a:gs pos="95000">
-                      <a:srgbClr xmlns:mc="http://schemas.openxmlformats.org/markup-compatibility/2006" xmlns:a14="http://schemas.microsoft.com/office/drawing/2010/main" val="000000" mc:Ignorable="">
+                      <a:srgbClr val="000000">
                         <a:shade val="47000"/>
                         <a:satMod val="150000"/>
                       </a:srgbClr>
                     </a:gs>
                     <a:gs pos="100000">
-                      <a:srgbClr xmlns:mc="http://schemas.openxmlformats.org/markup-compatibility/2006" xmlns:a14="http://schemas.microsoft.com/office/drawing/2010/main" val="000000" mc:Ignorable="">
+                      <a:srgbClr val="000000">
                         <a:shade val="39000"/>
                         <a:satMod val="150000"/>
                       </a:srgbClr>
@@ -4312,7 +4313,7 @@
                 </a:gradFill>
                 <a:effectLst>
                   <a:outerShdw blurRad="50800" algn="tl" rotWithShape="0">
-                    <a:srgbClr xmlns:mc="http://schemas.openxmlformats.org/markup-compatibility/2006" xmlns:a14="http://schemas.microsoft.com/office/drawing/2010/main" val="000000" mc:Ignorable=""/>
+                    <a:srgbClr val="000000"/>
                   </a:outerShdw>
                 </a:effectLst>
                 <a:latin typeface="Aharoni" pitchFamily="2" charset="-79"/>
@@ -4323,7 +4324,7 @@
             <a:endParaRPr lang="pt-BR" b="1" dirty="0">
               <a:ln w="17780" cmpd="sng">
                 <a:solidFill>
-                  <a:srgbClr xmlns:mc="http://schemas.openxmlformats.org/markup-compatibility/2006" xmlns:a14="http://schemas.microsoft.com/office/drawing/2010/main" val="FFFFFF" mc:Ignorable=""/>
+                  <a:srgbClr val="FFFFFF"/>
                 </a:solidFill>
                 <a:prstDash val="solid"/>
                 <a:miter lim="800000"/>
@@ -4331,34 +4332,34 @@
               <a:gradFill rotWithShape="1">
                 <a:gsLst>
                   <a:gs pos="0">
-                    <a:srgbClr xmlns:mc="http://schemas.openxmlformats.org/markup-compatibility/2006" xmlns:a14="http://schemas.microsoft.com/office/drawing/2010/main" val="000000" mc:Ignorable="">
+                    <a:srgbClr val="000000">
                       <a:tint val="92000"/>
                       <a:shade val="100000"/>
                       <a:satMod val="150000"/>
                     </a:srgbClr>
                   </a:gs>
                   <a:gs pos="49000">
-                    <a:srgbClr xmlns:mc="http://schemas.openxmlformats.org/markup-compatibility/2006" xmlns:a14="http://schemas.microsoft.com/office/drawing/2010/main" val="000000" mc:Ignorable="">
+                    <a:srgbClr val="000000">
                       <a:tint val="89000"/>
                       <a:shade val="90000"/>
                       <a:satMod val="150000"/>
                     </a:srgbClr>
                   </a:gs>
                   <a:gs pos="50000">
-                    <a:srgbClr xmlns:mc="http://schemas.openxmlformats.org/markup-compatibility/2006" xmlns:a14="http://schemas.microsoft.com/office/drawing/2010/main" val="000000" mc:Ignorable="">
+                    <a:srgbClr val="000000">
                       <a:tint val="100000"/>
                       <a:shade val="75000"/>
                       <a:satMod val="150000"/>
                     </a:srgbClr>
                   </a:gs>
                   <a:gs pos="95000">
-                    <a:srgbClr xmlns:mc="http://schemas.openxmlformats.org/markup-compatibility/2006" xmlns:a14="http://schemas.microsoft.com/office/drawing/2010/main" val="000000" mc:Ignorable="">
+                    <a:srgbClr val="000000">
                       <a:shade val="47000"/>
                       <a:satMod val="150000"/>
                     </a:srgbClr>
                   </a:gs>
                   <a:gs pos="100000">
-                    <a:srgbClr xmlns:mc="http://schemas.openxmlformats.org/markup-compatibility/2006" xmlns:a14="http://schemas.microsoft.com/office/drawing/2010/main" val="000000" mc:Ignorable="">
+                    <a:srgbClr val="000000">
                       <a:shade val="39000"/>
                       <a:satMod val="150000"/>
                     </a:srgbClr>
@@ -4368,7 +4369,7 @@
               </a:gradFill>
               <a:effectLst>
                 <a:outerShdw blurRad="50800" algn="tl" rotWithShape="0">
-                  <a:srgbClr xmlns:mc="http://schemas.openxmlformats.org/markup-compatibility/2006" xmlns:a14="http://schemas.microsoft.com/office/drawing/2010/main" val="000000" mc:Ignorable=""/>
+                  <a:srgbClr val="000000"/>
                 </a:outerShdw>
               </a:effectLst>
             </a:endParaRPr>
@@ -4453,7 +4454,7 @@
             </a:ln>
             <a:effectLst>
               <a:outerShdw blurRad="190500" algn="tl" rotWithShape="0">
-                <a:srgbClr xmlns:mc="http://schemas.openxmlformats.org/markup-compatibility/2006" xmlns:a14="http://schemas.microsoft.com/office/drawing/2010/main" val="000000" mc:Ignorable="">
+                <a:srgbClr val="000000">
                   <a:alpha val="70000"/>
                 </a:srgbClr>
               </a:outerShdw>
@@ -4462,7 +4463,7 @@
               <a:ext uri="{909E8E84-426E-40DD-AFC4-6F175D3DCCD1}">
                 <a14:hiddenFill xmlns:a14="http://schemas.microsoft.com/office/drawing/2010/main">
                   <a:solidFill>
-                    <a:srgbClr xmlns:mc="http://schemas.openxmlformats.org/markup-compatibility/2006" val="FFFFFF" mc:Ignorable=""/>
+                    <a:srgbClr val="FFFFFF"/>
                   </a:solidFill>
                 </a14:hiddenFill>
               </a:ext>
@@ -4494,7 +4495,7 @@
                 <a:rPr lang="pt-BR" sz="6600" b="1" dirty="0" smtClean="0">
                   <a:ln w="17780" cmpd="sng">
                     <a:solidFill>
-                      <a:srgbClr xmlns:mc="http://schemas.openxmlformats.org/markup-compatibility/2006" xmlns:a14="http://schemas.microsoft.com/office/drawing/2010/main" val="FFFFFF" mc:Ignorable=""/>
+                      <a:srgbClr val="FFFFFF"/>
                     </a:solidFill>
                     <a:prstDash val="solid"/>
                     <a:miter lim="800000"/>
@@ -4502,34 +4503,34 @@
                   <a:gradFill rotWithShape="1">
                     <a:gsLst>
                       <a:gs pos="0">
-                        <a:srgbClr xmlns:mc="http://schemas.openxmlformats.org/markup-compatibility/2006" xmlns:a14="http://schemas.microsoft.com/office/drawing/2010/main" val="000000" mc:Ignorable="">
+                        <a:srgbClr val="000000">
                           <a:tint val="92000"/>
                           <a:shade val="100000"/>
                           <a:satMod val="150000"/>
                         </a:srgbClr>
                       </a:gs>
                       <a:gs pos="49000">
-                        <a:srgbClr xmlns:mc="http://schemas.openxmlformats.org/markup-compatibility/2006" xmlns:a14="http://schemas.microsoft.com/office/drawing/2010/main" val="000000" mc:Ignorable="">
+                        <a:srgbClr val="000000">
                           <a:tint val="89000"/>
                           <a:shade val="90000"/>
                           <a:satMod val="150000"/>
                         </a:srgbClr>
                       </a:gs>
                       <a:gs pos="50000">
-                        <a:srgbClr xmlns:mc="http://schemas.openxmlformats.org/markup-compatibility/2006" xmlns:a14="http://schemas.microsoft.com/office/drawing/2010/main" val="000000" mc:Ignorable="">
+                        <a:srgbClr val="000000">
                           <a:tint val="100000"/>
                           <a:shade val="75000"/>
                           <a:satMod val="150000"/>
                         </a:srgbClr>
                       </a:gs>
                       <a:gs pos="95000">
-                        <a:srgbClr xmlns:mc="http://schemas.openxmlformats.org/markup-compatibility/2006" xmlns:a14="http://schemas.microsoft.com/office/drawing/2010/main" val="000000" mc:Ignorable="">
+                        <a:srgbClr val="000000">
                           <a:shade val="47000"/>
                           <a:satMod val="150000"/>
                         </a:srgbClr>
                       </a:gs>
                       <a:gs pos="100000">
-                        <a:srgbClr xmlns:mc="http://schemas.openxmlformats.org/markup-compatibility/2006" xmlns:a14="http://schemas.microsoft.com/office/drawing/2010/main" val="000000" mc:Ignorable="">
+                        <a:srgbClr val="000000">
                           <a:shade val="39000"/>
                           <a:satMod val="150000"/>
                         </a:srgbClr>
@@ -4539,7 +4540,7 @@
                   </a:gradFill>
                   <a:effectLst>
                     <a:outerShdw blurRad="50800" algn="tl" rotWithShape="0">
-                      <a:srgbClr xmlns:mc="http://schemas.openxmlformats.org/markup-compatibility/2006" xmlns:a14="http://schemas.microsoft.com/office/drawing/2010/main" val="000000" mc:Ignorable=""/>
+                      <a:srgbClr val="000000"/>
                     </a:outerShdw>
                   </a:effectLst>
                   <a:latin typeface="Aharoni" pitchFamily="2" charset="-79"/>
@@ -4550,7 +4551,7 @@
               <a:endParaRPr lang="pt-BR" sz="6600" b="1" dirty="0">
                 <a:ln w="17780" cmpd="sng">
                   <a:solidFill>
-                    <a:srgbClr xmlns:mc="http://schemas.openxmlformats.org/markup-compatibility/2006" xmlns:a14="http://schemas.microsoft.com/office/drawing/2010/main" val="FFFFFF" mc:Ignorable=""/>
+                    <a:srgbClr val="FFFFFF"/>
                   </a:solidFill>
                   <a:prstDash val="solid"/>
                   <a:miter lim="800000"/>
@@ -4558,34 +4559,34 @@
                 <a:gradFill rotWithShape="1">
                   <a:gsLst>
                     <a:gs pos="0">
-                      <a:srgbClr xmlns:mc="http://schemas.openxmlformats.org/markup-compatibility/2006" xmlns:a14="http://schemas.microsoft.com/office/drawing/2010/main" val="000000" mc:Ignorable="">
+                      <a:srgbClr val="000000">
                         <a:tint val="92000"/>
                         <a:shade val="100000"/>
                         <a:satMod val="150000"/>
                       </a:srgbClr>
                     </a:gs>
                     <a:gs pos="49000">
-                      <a:srgbClr xmlns:mc="http://schemas.openxmlformats.org/markup-compatibility/2006" xmlns:a14="http://schemas.microsoft.com/office/drawing/2010/main" val="000000" mc:Ignorable="">
+                      <a:srgbClr val="000000">
                         <a:tint val="89000"/>
                         <a:shade val="90000"/>
                         <a:satMod val="150000"/>
                       </a:srgbClr>
                     </a:gs>
                     <a:gs pos="50000">
-                      <a:srgbClr xmlns:mc="http://schemas.openxmlformats.org/markup-compatibility/2006" xmlns:a14="http://schemas.microsoft.com/office/drawing/2010/main" val="000000" mc:Ignorable="">
+                      <a:srgbClr val="000000">
                         <a:tint val="100000"/>
                         <a:shade val="75000"/>
                         <a:satMod val="150000"/>
                       </a:srgbClr>
                     </a:gs>
                     <a:gs pos="95000">
-                      <a:srgbClr xmlns:mc="http://schemas.openxmlformats.org/markup-compatibility/2006" xmlns:a14="http://schemas.microsoft.com/office/drawing/2010/main" val="000000" mc:Ignorable="">
+                      <a:srgbClr val="000000">
                         <a:shade val="47000"/>
                         <a:satMod val="150000"/>
                       </a:srgbClr>
                     </a:gs>
                     <a:gs pos="100000">
-                      <a:srgbClr xmlns:mc="http://schemas.openxmlformats.org/markup-compatibility/2006" xmlns:a14="http://schemas.microsoft.com/office/drawing/2010/main" val="000000" mc:Ignorable="">
+                      <a:srgbClr val="000000">
                         <a:shade val="39000"/>
                         <a:satMod val="150000"/>
                       </a:srgbClr>
@@ -4595,7 +4596,7 @@
                 </a:gradFill>
                 <a:effectLst>
                   <a:outerShdw blurRad="50800" algn="tl" rotWithShape="0">
-                    <a:srgbClr xmlns:mc="http://schemas.openxmlformats.org/markup-compatibility/2006" xmlns:a14="http://schemas.microsoft.com/office/drawing/2010/main" val="000000" mc:Ignorable=""/>
+                    <a:srgbClr val="000000"/>
                   </a:outerShdw>
                 </a:effectLst>
               </a:endParaRPr>
@@ -4627,7 +4628,7 @@
                 <a:rPr lang="pt-BR" sz="4000" b="1" dirty="0" smtClean="0">
                   <a:ln w="17780" cmpd="sng">
                     <a:solidFill>
-                      <a:srgbClr xmlns:mc="http://schemas.openxmlformats.org/markup-compatibility/2006" xmlns:a14="http://schemas.microsoft.com/office/drawing/2010/main" val="FFFFFF" mc:Ignorable=""/>
+                      <a:srgbClr val="FFFFFF"/>
                     </a:solidFill>
                     <a:prstDash val="solid"/>
                     <a:miter lim="800000"/>
@@ -4635,34 +4636,34 @@
                   <a:gradFill rotWithShape="1">
                     <a:gsLst>
                       <a:gs pos="0">
-                        <a:srgbClr xmlns:mc="http://schemas.openxmlformats.org/markup-compatibility/2006" xmlns:a14="http://schemas.microsoft.com/office/drawing/2010/main" val="000000" mc:Ignorable="">
+                        <a:srgbClr val="000000">
                           <a:tint val="92000"/>
                           <a:shade val="100000"/>
                           <a:satMod val="150000"/>
                         </a:srgbClr>
                       </a:gs>
                       <a:gs pos="49000">
-                        <a:srgbClr xmlns:mc="http://schemas.openxmlformats.org/markup-compatibility/2006" xmlns:a14="http://schemas.microsoft.com/office/drawing/2010/main" val="000000" mc:Ignorable="">
+                        <a:srgbClr val="000000">
                           <a:tint val="89000"/>
                           <a:shade val="90000"/>
                           <a:satMod val="150000"/>
                         </a:srgbClr>
                       </a:gs>
                       <a:gs pos="50000">
-                        <a:srgbClr xmlns:mc="http://schemas.openxmlformats.org/markup-compatibility/2006" xmlns:a14="http://schemas.microsoft.com/office/drawing/2010/main" val="000000" mc:Ignorable="">
+                        <a:srgbClr val="000000">
                           <a:tint val="100000"/>
                           <a:shade val="75000"/>
                           <a:satMod val="150000"/>
                         </a:srgbClr>
                       </a:gs>
                       <a:gs pos="95000">
-                        <a:srgbClr xmlns:mc="http://schemas.openxmlformats.org/markup-compatibility/2006" xmlns:a14="http://schemas.microsoft.com/office/drawing/2010/main" val="000000" mc:Ignorable="">
+                        <a:srgbClr val="000000">
                           <a:shade val="47000"/>
                           <a:satMod val="150000"/>
                         </a:srgbClr>
                       </a:gs>
                       <a:gs pos="100000">
-                        <a:srgbClr xmlns:mc="http://schemas.openxmlformats.org/markup-compatibility/2006" xmlns:a14="http://schemas.microsoft.com/office/drawing/2010/main" val="000000" mc:Ignorable="">
+                        <a:srgbClr val="000000">
                           <a:shade val="39000"/>
                           <a:satMod val="150000"/>
                         </a:srgbClr>
@@ -4672,7 +4673,7 @@
                   </a:gradFill>
                   <a:effectLst>
                     <a:outerShdw blurRad="50800" algn="tl" rotWithShape="0">
-                      <a:srgbClr xmlns:mc="http://schemas.openxmlformats.org/markup-compatibility/2006" xmlns:a14="http://schemas.microsoft.com/office/drawing/2010/main" val="000000" mc:Ignorable=""/>
+                      <a:srgbClr val="000000"/>
                     </a:outerShdw>
                   </a:effectLst>
                   <a:latin typeface="Aharoni" pitchFamily="2" charset="-79"/>
@@ -4683,7 +4684,7 @@
               <a:endParaRPr lang="pt-BR" sz="4000" b="1" dirty="0">
                 <a:ln w="17780" cmpd="sng">
                   <a:solidFill>
-                    <a:srgbClr xmlns:mc="http://schemas.openxmlformats.org/markup-compatibility/2006" xmlns:a14="http://schemas.microsoft.com/office/drawing/2010/main" val="FFFFFF" mc:Ignorable=""/>
+                    <a:srgbClr val="FFFFFF"/>
                   </a:solidFill>
                   <a:prstDash val="solid"/>
                   <a:miter lim="800000"/>
@@ -4691,34 +4692,34 @@
                 <a:gradFill rotWithShape="1">
                   <a:gsLst>
                     <a:gs pos="0">
-                      <a:srgbClr xmlns:mc="http://schemas.openxmlformats.org/markup-compatibility/2006" xmlns:a14="http://schemas.microsoft.com/office/drawing/2010/main" val="000000" mc:Ignorable="">
+                      <a:srgbClr val="000000">
                         <a:tint val="92000"/>
                         <a:shade val="100000"/>
                         <a:satMod val="150000"/>
                       </a:srgbClr>
                     </a:gs>
                     <a:gs pos="49000">
-                      <a:srgbClr xmlns:mc="http://schemas.openxmlformats.org/markup-compatibility/2006" xmlns:a14="http://schemas.microsoft.com/office/drawing/2010/main" val="000000" mc:Ignorable="">
+                      <a:srgbClr val="000000">
                         <a:tint val="89000"/>
                         <a:shade val="90000"/>
                         <a:satMod val="150000"/>
                       </a:srgbClr>
                     </a:gs>
                     <a:gs pos="50000">
-                      <a:srgbClr xmlns:mc="http://schemas.openxmlformats.org/markup-compatibility/2006" xmlns:a14="http://schemas.microsoft.com/office/drawing/2010/main" val="000000" mc:Ignorable="">
+                      <a:srgbClr val="000000">
                         <a:tint val="100000"/>
                         <a:shade val="75000"/>
                         <a:satMod val="150000"/>
                       </a:srgbClr>
                     </a:gs>
                     <a:gs pos="95000">
-                      <a:srgbClr xmlns:mc="http://schemas.openxmlformats.org/markup-compatibility/2006" xmlns:a14="http://schemas.microsoft.com/office/drawing/2010/main" val="000000" mc:Ignorable="">
+                      <a:srgbClr val="000000">
                         <a:shade val="47000"/>
                         <a:satMod val="150000"/>
                       </a:srgbClr>
                     </a:gs>
                     <a:gs pos="100000">
-                      <a:srgbClr xmlns:mc="http://schemas.openxmlformats.org/markup-compatibility/2006" xmlns:a14="http://schemas.microsoft.com/office/drawing/2010/main" val="000000" mc:Ignorable="">
+                      <a:srgbClr val="000000">
                         <a:shade val="39000"/>
                         <a:satMod val="150000"/>
                       </a:srgbClr>
@@ -4728,7 +4729,7 @@
                 </a:gradFill>
                 <a:effectLst>
                   <a:outerShdw blurRad="50800" algn="tl" rotWithShape="0">
-                    <a:srgbClr xmlns:mc="http://schemas.openxmlformats.org/markup-compatibility/2006" xmlns:a14="http://schemas.microsoft.com/office/drawing/2010/main" val="000000" mc:Ignorable=""/>
+                    <a:srgbClr val="000000"/>
                   </a:outerShdw>
                 </a:effectLst>
               </a:endParaRPr>
@@ -4760,7 +4761,7 @@
                 <a:rPr lang="pt-BR" sz="2300" b="1" dirty="0">
                   <a:ln w="17780" cmpd="sng">
                     <a:solidFill>
-                      <a:srgbClr xmlns:mc="http://schemas.openxmlformats.org/markup-compatibility/2006" xmlns:a14="http://schemas.microsoft.com/office/drawing/2010/main" val="FFFFFF" mc:Ignorable=""/>
+                      <a:srgbClr val="FFFFFF"/>
                     </a:solidFill>
                     <a:prstDash val="solid"/>
                     <a:miter lim="800000"/>
@@ -4768,34 +4769,34 @@
                   <a:gradFill rotWithShape="1">
                     <a:gsLst>
                       <a:gs pos="0">
-                        <a:srgbClr xmlns:mc="http://schemas.openxmlformats.org/markup-compatibility/2006" xmlns:a14="http://schemas.microsoft.com/office/drawing/2010/main" val="000000" mc:Ignorable="">
+                        <a:srgbClr val="000000">
                           <a:tint val="92000"/>
                           <a:shade val="100000"/>
                           <a:satMod val="150000"/>
                         </a:srgbClr>
                       </a:gs>
                       <a:gs pos="49000">
-                        <a:srgbClr xmlns:mc="http://schemas.openxmlformats.org/markup-compatibility/2006" xmlns:a14="http://schemas.microsoft.com/office/drawing/2010/main" val="000000" mc:Ignorable="">
+                        <a:srgbClr val="000000">
                           <a:tint val="89000"/>
                           <a:shade val="90000"/>
                           <a:satMod val="150000"/>
                         </a:srgbClr>
                       </a:gs>
                       <a:gs pos="50000">
-                        <a:srgbClr xmlns:mc="http://schemas.openxmlformats.org/markup-compatibility/2006" xmlns:a14="http://schemas.microsoft.com/office/drawing/2010/main" val="000000" mc:Ignorable="">
+                        <a:srgbClr val="000000">
                           <a:tint val="100000"/>
                           <a:shade val="75000"/>
                           <a:satMod val="150000"/>
                         </a:srgbClr>
                       </a:gs>
                       <a:gs pos="95000">
-                        <a:srgbClr xmlns:mc="http://schemas.openxmlformats.org/markup-compatibility/2006" xmlns:a14="http://schemas.microsoft.com/office/drawing/2010/main" val="000000" mc:Ignorable="">
+                        <a:srgbClr val="000000">
                           <a:shade val="47000"/>
                           <a:satMod val="150000"/>
                         </a:srgbClr>
                       </a:gs>
                       <a:gs pos="100000">
-                        <a:srgbClr xmlns:mc="http://schemas.openxmlformats.org/markup-compatibility/2006" xmlns:a14="http://schemas.microsoft.com/office/drawing/2010/main" val="000000" mc:Ignorable="">
+                        <a:srgbClr val="000000">
                           <a:shade val="39000"/>
                           <a:satMod val="150000"/>
                         </a:srgbClr>
@@ -4805,7 +4806,7 @@
                   </a:gradFill>
                   <a:effectLst>
                     <a:outerShdw blurRad="50800" algn="tl" rotWithShape="0">
-                      <a:srgbClr xmlns:mc="http://schemas.openxmlformats.org/markup-compatibility/2006" xmlns:a14="http://schemas.microsoft.com/office/drawing/2010/main" val="000000" mc:Ignorable=""/>
+                      <a:srgbClr val="000000"/>
                     </a:outerShdw>
                   </a:effectLst>
                   <a:latin typeface="Aharoni" pitchFamily="2" charset="-79"/>
@@ -4816,7 +4817,7 @@
               <a:endParaRPr lang="pt-BR" sz="2300" b="1" dirty="0">
                 <a:ln w="17780" cmpd="sng">
                   <a:solidFill>
-                    <a:srgbClr xmlns:mc="http://schemas.openxmlformats.org/markup-compatibility/2006" xmlns:a14="http://schemas.microsoft.com/office/drawing/2010/main" val="FFFFFF" mc:Ignorable=""/>
+                    <a:srgbClr val="FFFFFF"/>
                   </a:solidFill>
                   <a:prstDash val="solid"/>
                   <a:miter lim="800000"/>
@@ -4824,34 +4825,34 @@
                 <a:gradFill rotWithShape="1">
                   <a:gsLst>
                     <a:gs pos="0">
-                      <a:srgbClr xmlns:mc="http://schemas.openxmlformats.org/markup-compatibility/2006" xmlns:a14="http://schemas.microsoft.com/office/drawing/2010/main" val="000000" mc:Ignorable="">
+                      <a:srgbClr val="000000">
                         <a:tint val="92000"/>
                         <a:shade val="100000"/>
                         <a:satMod val="150000"/>
                       </a:srgbClr>
                     </a:gs>
                     <a:gs pos="49000">
-                      <a:srgbClr xmlns:mc="http://schemas.openxmlformats.org/markup-compatibility/2006" xmlns:a14="http://schemas.microsoft.com/office/drawing/2010/main" val="000000" mc:Ignorable="">
+                      <a:srgbClr val="000000">
                         <a:tint val="89000"/>
                         <a:shade val="90000"/>
                         <a:satMod val="150000"/>
                       </a:srgbClr>
                     </a:gs>
                     <a:gs pos="50000">
-                      <a:srgbClr xmlns:mc="http://schemas.openxmlformats.org/markup-compatibility/2006" xmlns:a14="http://schemas.microsoft.com/office/drawing/2010/main" val="000000" mc:Ignorable="">
+                      <a:srgbClr val="000000">
                         <a:tint val="100000"/>
                         <a:shade val="75000"/>
                         <a:satMod val="150000"/>
                       </a:srgbClr>
                     </a:gs>
                     <a:gs pos="95000">
-                      <a:srgbClr xmlns:mc="http://schemas.openxmlformats.org/markup-compatibility/2006" xmlns:a14="http://schemas.microsoft.com/office/drawing/2010/main" val="000000" mc:Ignorable="">
+                      <a:srgbClr val="000000">
                         <a:shade val="47000"/>
                         <a:satMod val="150000"/>
                       </a:srgbClr>
                     </a:gs>
                     <a:gs pos="100000">
-                      <a:srgbClr xmlns:mc="http://schemas.openxmlformats.org/markup-compatibility/2006" xmlns:a14="http://schemas.microsoft.com/office/drawing/2010/main" val="000000" mc:Ignorable="">
+                      <a:srgbClr val="000000">
                         <a:shade val="39000"/>
                         <a:satMod val="150000"/>
                       </a:srgbClr>
@@ -4861,7 +4862,7 @@
                 </a:gradFill>
                 <a:effectLst>
                   <a:outerShdw blurRad="50800" algn="tl" rotWithShape="0">
-                    <a:srgbClr xmlns:mc="http://schemas.openxmlformats.org/markup-compatibility/2006" xmlns:a14="http://schemas.microsoft.com/office/drawing/2010/main" val="000000" mc:Ignorable=""/>
+                    <a:srgbClr val="000000"/>
                   </a:outerShdw>
                 </a:effectLst>
               </a:endParaRPr>
@@ -4882,6 +4883,367 @@
 </p:sld>
 </file>
 
+<file path=ppt/slides/slide6.xml><?xml version="1.0" encoding="utf-8"?>
+<p:sld xmlns:a="http://schemas.openxmlformats.org/drawingml/2006/main" xmlns:r="http://schemas.openxmlformats.org/officeDocument/2006/relationships" xmlns:p="http://schemas.openxmlformats.org/presentationml/2006/main">
+  <p:cSld>
+    <p:spTree>
+      <p:nvGrpSpPr>
+        <p:cNvPr id="1" name=""/>
+        <p:cNvGrpSpPr/>
+        <p:nvPr/>
+      </p:nvGrpSpPr>
+      <p:grpSpPr>
+        <a:xfrm>
+          <a:off x="0" y="0"/>
+          <a:ext cx="0" cy="0"/>
+          <a:chOff x="0" y="0"/>
+          <a:chExt cx="0" cy="0"/>
+        </a:xfrm>
+      </p:grpSpPr>
+      <p:grpSp>
+        <p:nvGrpSpPr>
+          <p:cNvPr id="6" name="Group 5"/>
+          <p:cNvGrpSpPr/>
+          <p:nvPr/>
+        </p:nvGrpSpPr>
+        <p:grpSpPr>
+          <a:xfrm>
+            <a:off x="1135094" y="1723151"/>
+            <a:ext cx="3562194" cy="3079534"/>
+            <a:chOff x="1135094" y="1723151"/>
+            <a:chExt cx="3562194" cy="3079534"/>
+          </a:xfrm>
+        </p:grpSpPr>
+        <p:pic>
+          <p:nvPicPr>
+            <p:cNvPr id="3" name="Picture 2" descr="C:\Users\Cesar\page1.png"/>
+            <p:cNvPicPr>
+              <a:picLocks noChangeAspect="1" noChangeArrowheads="1"/>
+            </p:cNvPicPr>
+            <p:nvPr/>
+          </p:nvPicPr>
+          <p:blipFill>
+            <a:blip r:embed="rId2">
+              <a:extLst>
+                <a:ext uri="{28A0092B-C50C-407E-A947-70E740481C1C}">
+                  <a14:useLocalDpi xmlns:a14="http://schemas.microsoft.com/office/drawing/2010/main" val="0"/>
+                </a:ext>
+              </a:extLst>
+            </a:blip>
+            <a:srcRect/>
+            <a:stretch>
+              <a:fillRect/>
+            </a:stretch>
+          </p:blipFill>
+          <p:spPr bwMode="auto">
+            <a:xfrm>
+              <a:off x="2339752" y="1723151"/>
+              <a:ext cx="1531646" cy="3079534"/>
+            </a:xfrm>
+            <a:prstGeom prst="rect">
+              <a:avLst/>
+            </a:prstGeom>
+            <a:ln>
+              <a:noFill/>
+            </a:ln>
+            <a:effectLst>
+              <a:outerShdw blurRad="190500" algn="tl" rotWithShape="0">
+                <a:srgbClr val="000000">
+                  <a:alpha val="70000"/>
+                </a:srgbClr>
+              </a:outerShdw>
+            </a:effectLst>
+            <a:extLst>
+              <a:ext uri="{909E8E84-426E-40DD-AFC4-6F175D3DCCD1}">
+                <a14:hiddenFill xmlns:a14="http://schemas.microsoft.com/office/drawing/2010/main">
+                  <a:solidFill>
+                    <a:srgbClr val="FFFFFF"/>
+                  </a:solidFill>
+                </a14:hiddenFill>
+              </a:ext>
+            </a:extLst>
+          </p:spPr>
+        </p:pic>
+        <p:sp>
+          <p:nvSpPr>
+            <p:cNvPr id="4" name="Rectangle 3"/>
+            <p:cNvSpPr/>
+            <p:nvPr/>
+          </p:nvSpPr>
+          <p:spPr>
+            <a:xfrm>
+              <a:off x="1135094" y="2703966"/>
+              <a:ext cx="3562194" cy="1107996"/>
+            </a:xfrm>
+            <a:prstGeom prst="rect">
+              <a:avLst/>
+            </a:prstGeom>
+          </p:spPr>
+          <p:txBody>
+            <a:bodyPr wrap="none">
+              <a:spAutoFit/>
+            </a:bodyPr>
+            <a:lstStyle/>
+            <a:p>
+              <a:r>
+                <a:rPr lang="pt-BR" sz="6600" b="1" dirty="0" smtClean="0">
+                  <a:ln w="17780" cmpd="sng">
+                    <a:solidFill>
+                      <a:srgbClr val="FFFFFF"/>
+                    </a:solidFill>
+                    <a:prstDash val="solid"/>
+                    <a:miter lim="800000"/>
+                  </a:ln>
+                  <a:gradFill rotWithShape="1">
+                    <a:gsLst>
+                      <a:gs pos="0">
+                        <a:srgbClr val="000000">
+                          <a:tint val="92000"/>
+                          <a:shade val="100000"/>
+                          <a:satMod val="150000"/>
+                        </a:srgbClr>
+                      </a:gs>
+                      <a:gs pos="49000">
+                        <a:srgbClr val="000000">
+                          <a:tint val="89000"/>
+                          <a:shade val="90000"/>
+                          <a:satMod val="150000"/>
+                        </a:srgbClr>
+                      </a:gs>
+                      <a:gs pos="50000">
+                        <a:srgbClr val="000000">
+                          <a:tint val="100000"/>
+                          <a:shade val="75000"/>
+                          <a:satMod val="150000"/>
+                        </a:srgbClr>
+                      </a:gs>
+                      <a:gs pos="95000">
+                        <a:srgbClr val="000000">
+                          <a:shade val="47000"/>
+                          <a:satMod val="150000"/>
+                        </a:srgbClr>
+                      </a:gs>
+                      <a:gs pos="100000">
+                        <a:srgbClr val="000000">
+                          <a:shade val="39000"/>
+                          <a:satMod val="150000"/>
+                        </a:srgbClr>
+                      </a:gs>
+                    </a:gsLst>
+                    <a:lin ang="5400000"/>
+                  </a:gradFill>
+                  <a:effectLst>
+                    <a:outerShdw blurRad="50800" algn="tl" rotWithShape="0">
+                      <a:srgbClr val="000000"/>
+                    </a:outerShdw>
+                  </a:effectLst>
+                  <a:latin typeface="Aharoni" pitchFamily="2" charset="-79"/>
+                  <a:cs typeface="Aharoni" pitchFamily="2" charset="-79"/>
+                </a:rPr>
+                <a:t>Acc     rd</a:t>
+              </a:r>
+              <a:endParaRPr lang="pt-BR" sz="6600" b="1" dirty="0">
+                <a:ln w="17780" cmpd="sng">
+                  <a:solidFill>
+                    <a:srgbClr val="FFFFFF"/>
+                  </a:solidFill>
+                  <a:prstDash val="solid"/>
+                  <a:miter lim="800000"/>
+                </a:ln>
+                <a:gradFill rotWithShape="1">
+                  <a:gsLst>
+                    <a:gs pos="0">
+                      <a:srgbClr val="000000">
+                        <a:tint val="92000"/>
+                        <a:shade val="100000"/>
+                        <a:satMod val="150000"/>
+                      </a:srgbClr>
+                    </a:gs>
+                    <a:gs pos="49000">
+                      <a:srgbClr val="000000">
+                        <a:tint val="89000"/>
+                        <a:shade val="90000"/>
+                        <a:satMod val="150000"/>
+                      </a:srgbClr>
+                    </a:gs>
+                    <a:gs pos="50000">
+                      <a:srgbClr val="000000">
+                        <a:tint val="100000"/>
+                        <a:shade val="75000"/>
+                        <a:satMod val="150000"/>
+                      </a:srgbClr>
+                    </a:gs>
+                    <a:gs pos="95000">
+                      <a:srgbClr val="000000">
+                        <a:shade val="47000"/>
+                        <a:satMod val="150000"/>
+                      </a:srgbClr>
+                    </a:gs>
+                    <a:gs pos="100000">
+                      <a:srgbClr val="000000">
+                        <a:shade val="39000"/>
+                        <a:satMod val="150000"/>
+                      </a:srgbClr>
+                    </a:gs>
+                  </a:gsLst>
+                  <a:lin ang="5400000"/>
+                </a:gradFill>
+                <a:effectLst>
+                  <a:outerShdw blurRad="50800" algn="tl" rotWithShape="0">
+                    <a:srgbClr val="000000"/>
+                  </a:outerShdw>
+                </a:effectLst>
+              </a:endParaRPr>
+            </a:p>
+          </p:txBody>
+        </p:sp>
+        <p:sp>
+          <p:nvSpPr>
+            <p:cNvPr id="5" name="Rectangle 4"/>
+            <p:cNvSpPr/>
+            <p:nvPr/>
+          </p:nvSpPr>
+          <p:spPr>
+            <a:xfrm>
+              <a:off x="3436917" y="3545720"/>
+              <a:ext cx="1205779" cy="707886"/>
+            </a:xfrm>
+            <a:prstGeom prst="rect">
+              <a:avLst/>
+            </a:prstGeom>
+          </p:spPr>
+          <p:txBody>
+            <a:bodyPr wrap="none">
+              <a:spAutoFit/>
+            </a:bodyPr>
+            <a:lstStyle/>
+            <a:p>
+              <a:r>
+                <a:rPr lang="pt-BR" sz="4000" b="1" dirty="0" smtClean="0">
+                  <a:ln w="17780" cmpd="sng">
+                    <a:solidFill>
+                      <a:srgbClr val="FFFFFF"/>
+                    </a:solidFill>
+                    <a:prstDash val="solid"/>
+                    <a:miter lim="800000"/>
+                  </a:ln>
+                  <a:gradFill rotWithShape="1">
+                    <a:gsLst>
+                      <a:gs pos="0">
+                        <a:srgbClr val="000000">
+                          <a:tint val="92000"/>
+                          <a:shade val="100000"/>
+                          <a:satMod val="150000"/>
+                        </a:srgbClr>
+                      </a:gs>
+                      <a:gs pos="49000">
+                        <a:srgbClr val="000000">
+                          <a:tint val="89000"/>
+                          <a:shade val="90000"/>
+                          <a:satMod val="150000"/>
+                        </a:srgbClr>
+                      </a:gs>
+                      <a:gs pos="50000">
+                        <a:srgbClr val="000000">
+                          <a:tint val="100000"/>
+                          <a:shade val="75000"/>
+                          <a:satMod val="150000"/>
+                        </a:srgbClr>
+                      </a:gs>
+                      <a:gs pos="95000">
+                        <a:srgbClr val="000000">
+                          <a:shade val="47000"/>
+                          <a:satMod val="150000"/>
+                        </a:srgbClr>
+                      </a:gs>
+                      <a:gs pos="100000">
+                        <a:srgbClr val="000000">
+                          <a:shade val="39000"/>
+                          <a:satMod val="150000"/>
+                        </a:srgbClr>
+                      </a:gs>
+                    </a:gsLst>
+                    <a:lin ang="5400000"/>
+                  </a:gradFill>
+                  <a:effectLst>
+                    <a:outerShdw blurRad="50800" algn="tl" rotWithShape="0">
+                      <a:srgbClr val="000000"/>
+                    </a:outerShdw>
+                  </a:effectLst>
+                  <a:latin typeface="Aharoni" pitchFamily="2" charset="-79"/>
+                  <a:cs typeface="Aharoni" pitchFamily="2" charset="-79"/>
+                </a:rPr>
+                <a:t>.NET</a:t>
+              </a:r>
+              <a:endParaRPr lang="pt-BR" sz="4000" b="1" dirty="0">
+                <a:ln w="17780" cmpd="sng">
+                  <a:solidFill>
+                    <a:srgbClr val="FFFFFF"/>
+                  </a:solidFill>
+                  <a:prstDash val="solid"/>
+                  <a:miter lim="800000"/>
+                </a:ln>
+                <a:gradFill rotWithShape="1">
+                  <a:gsLst>
+                    <a:gs pos="0">
+                      <a:srgbClr val="000000">
+                        <a:tint val="92000"/>
+                        <a:shade val="100000"/>
+                        <a:satMod val="150000"/>
+                      </a:srgbClr>
+                    </a:gs>
+                    <a:gs pos="49000">
+                      <a:srgbClr val="000000">
+                        <a:tint val="89000"/>
+                        <a:shade val="90000"/>
+                        <a:satMod val="150000"/>
+                      </a:srgbClr>
+                    </a:gs>
+                    <a:gs pos="50000">
+                      <a:srgbClr val="000000">
+                        <a:tint val="100000"/>
+                        <a:shade val="75000"/>
+                        <a:satMod val="150000"/>
+                      </a:srgbClr>
+                    </a:gs>
+                    <a:gs pos="95000">
+                      <a:srgbClr val="000000">
+                        <a:shade val="47000"/>
+                        <a:satMod val="150000"/>
+                      </a:srgbClr>
+                    </a:gs>
+                    <a:gs pos="100000">
+                      <a:srgbClr val="000000">
+                        <a:shade val="39000"/>
+                        <a:satMod val="150000"/>
+                      </a:srgbClr>
+                    </a:gs>
+                  </a:gsLst>
+                  <a:lin ang="5400000"/>
+                </a:gradFill>
+                <a:effectLst>
+                  <a:outerShdw blurRad="50800" algn="tl" rotWithShape="0">
+                    <a:srgbClr val="000000"/>
+                  </a:outerShdw>
+                </a:effectLst>
+              </a:endParaRPr>
+            </a:p>
+          </p:txBody>
+        </p:sp>
+      </p:grpSp>
+    </p:spTree>
+    <p:extLst>
+      <p:ext uri="{BB962C8B-B14F-4D97-AF65-F5344CB8AC3E}">
+        <p14:creationId xmlns:p14="http://schemas.microsoft.com/office/powerpoint/2010/main" val="1173798902"/>
+      </p:ext>
+    </p:extLst>
+  </p:cSld>
+  <p:clrMapOvr>
+    <a:masterClrMapping/>
+  </p:clrMapOvr>
+</p:sld>
+</file>
+
 <file path=ppt/theme/theme1.xml><?xml version="1.0" encoding="utf-8"?>
 <a:theme xmlns:a="http://schemas.openxmlformats.org/drawingml/2006/main" name="Office Theme">
   <a:themeElements>
@@ -4893,34 +5255,34 @@
         <a:sysClr val="window" lastClr="FFFFFF"/>
       </a:lt1>
       <a:dk2>
-        <a:srgbClr xmlns:mc="http://schemas.openxmlformats.org/markup-compatibility/2006" xmlns:a14="http://schemas.microsoft.com/office/drawing/2010/main" val="1F497D" mc:Ignorable=""/>
+        <a:srgbClr val="1F497D"/>
       </a:dk2>
       <a:lt2>
-        <a:srgbClr xmlns:mc="http://schemas.openxmlformats.org/markup-compatibility/2006" xmlns:a14="http://schemas.microsoft.com/office/drawing/2010/main" val="EEECE1" mc:Ignorable=""/>
+        <a:srgbClr val="EEECE1"/>
       </a:lt2>
       <a:accent1>
-        <a:srgbClr xmlns:mc="http://schemas.openxmlformats.org/markup-compatibility/2006" xmlns:a14="http://schemas.microsoft.com/office/drawing/2010/main" val="4F81BD" mc:Ignorable=""/>
+        <a:srgbClr val="4F81BD"/>
       </a:accent1>
       <a:accent2>
-        <a:srgbClr xmlns:mc="http://schemas.openxmlformats.org/markup-compatibility/2006" xmlns:a14="http://schemas.microsoft.com/office/drawing/2010/main" val="C0504D" mc:Ignorable=""/>
+        <a:srgbClr val="C0504D"/>
       </a:accent2>
       <a:accent3>
-        <a:srgbClr xmlns:mc="http://schemas.openxmlformats.org/markup-compatibility/2006" xmlns:a14="http://schemas.microsoft.com/office/drawing/2010/main" val="9BBB59" mc:Ignorable=""/>
+        <a:srgbClr val="9BBB59"/>
       </a:accent3>
       <a:accent4>
-        <a:srgbClr xmlns:mc="http://schemas.openxmlformats.org/markup-compatibility/2006" xmlns:a14="http://schemas.microsoft.com/office/drawing/2010/main" val="8064A2" mc:Ignorable=""/>
+        <a:srgbClr val="8064A2"/>
       </a:accent4>
       <a:accent5>
-        <a:srgbClr xmlns:mc="http://schemas.openxmlformats.org/markup-compatibility/2006" xmlns:a14="http://schemas.microsoft.com/office/drawing/2010/main" val="4BACC6" mc:Ignorable=""/>
+        <a:srgbClr val="4BACC6"/>
       </a:accent5>
       <a:accent6>
-        <a:srgbClr xmlns:mc="http://schemas.openxmlformats.org/markup-compatibility/2006" xmlns:a14="http://schemas.microsoft.com/office/drawing/2010/main" val="F79646" mc:Ignorable=""/>
+        <a:srgbClr val="F79646"/>
       </a:accent6>
       <a:hlink>
-        <a:srgbClr xmlns:mc="http://schemas.openxmlformats.org/markup-compatibility/2006" xmlns:a14="http://schemas.microsoft.com/office/drawing/2010/main" val="0000FF" mc:Ignorable=""/>
+        <a:srgbClr val="0000FF"/>
       </a:hlink>
       <a:folHlink>
-        <a:srgbClr xmlns:mc="http://schemas.openxmlformats.org/markup-compatibility/2006" xmlns:a14="http://schemas.microsoft.com/office/drawing/2010/main" val="800080" mc:Ignorable=""/>
+        <a:srgbClr val="800080"/>
       </a:folHlink>
     </a:clrScheme>
     <a:fontScheme name="Office">
@@ -5074,7 +5436,7 @@
         <a:effectStyle>
           <a:effectLst>
             <a:outerShdw blurRad="40000" dist="20000" dir="5400000" rotWithShape="0">
-              <a:srgbClr xmlns:mc="http://schemas.openxmlformats.org/markup-compatibility/2006" xmlns:a14="http://schemas.microsoft.com/office/drawing/2010/main" val="000000" mc:Ignorable="">
+              <a:srgbClr val="000000">
                 <a:alpha val="38000"/>
               </a:srgbClr>
             </a:outerShdw>
@@ -5083,7 +5445,7 @@
         <a:effectStyle>
           <a:effectLst>
             <a:outerShdw blurRad="40000" dist="23000" dir="5400000" rotWithShape="0">
-              <a:srgbClr xmlns:mc="http://schemas.openxmlformats.org/markup-compatibility/2006" xmlns:a14="http://schemas.microsoft.com/office/drawing/2010/main" val="000000" mc:Ignorable="">
+              <a:srgbClr val="000000">
                 <a:alpha val="35000"/>
               </a:srgbClr>
             </a:outerShdw>
@@ -5092,7 +5454,7 @@
         <a:effectStyle>
           <a:effectLst>
             <a:outerShdw blurRad="40000" dist="23000" dir="5400000" rotWithShape="0">
-              <a:srgbClr xmlns:mc="http://schemas.openxmlformats.org/markup-compatibility/2006" xmlns:a14="http://schemas.microsoft.com/office/drawing/2010/main" val="000000" mc:Ignorable="">
+              <a:srgbClr val="000000">
                 <a:alpha val="35000"/>
               </a:srgbClr>
             </a:outerShdw>

</xml_diff>